<commit_message>
Updates to week 2 and 3
</commit_message>
<xml_diff>
--- a/02 Strategy/OCP.pptx
+++ b/02 Strategy/OCP.pptx
@@ -5,22 +5,23 @@
     <p:sldMasterId id="2147483648" r:id="rId1"/>
   </p:sldMasterIdLst>
   <p:notesMasterIdLst>
-    <p:notesMasterId r:id="rId15"/>
+    <p:notesMasterId r:id="rId16"/>
   </p:notesMasterIdLst>
   <p:sldIdLst>
-    <p:sldId id="256" r:id="rId2"/>
-    <p:sldId id="278" r:id="rId3"/>
-    <p:sldId id="298" r:id="rId4"/>
-    <p:sldId id="280" r:id="rId5"/>
-    <p:sldId id="287" r:id="rId6"/>
-    <p:sldId id="288" r:id="rId7"/>
-    <p:sldId id="289" r:id="rId8"/>
-    <p:sldId id="290" r:id="rId9"/>
-    <p:sldId id="291" r:id="rId10"/>
-    <p:sldId id="292" r:id="rId11"/>
-    <p:sldId id="293" r:id="rId12"/>
-    <p:sldId id="295" r:id="rId13"/>
-    <p:sldId id="259" r:id="rId14"/>
+    <p:sldId id="299" r:id="rId2"/>
+    <p:sldId id="256" r:id="rId3"/>
+    <p:sldId id="278" r:id="rId4"/>
+    <p:sldId id="298" r:id="rId5"/>
+    <p:sldId id="280" r:id="rId6"/>
+    <p:sldId id="287" r:id="rId7"/>
+    <p:sldId id="288" r:id="rId8"/>
+    <p:sldId id="289" r:id="rId9"/>
+    <p:sldId id="290" r:id="rId10"/>
+    <p:sldId id="291" r:id="rId11"/>
+    <p:sldId id="292" r:id="rId12"/>
+    <p:sldId id="293" r:id="rId13"/>
+    <p:sldId id="295" r:id="rId14"/>
+    <p:sldId id="259" r:id="rId15"/>
   </p:sldIdLst>
   <p:sldSz cx="9144000" cy="6858000" type="screen4x3"/>
   <p:notesSz cx="6858000" cy="9144000"/>
@@ -220,7 +221,7 @@
           <a:p>
             <a:fld id="{8A6E8EB0-8888-4A4E-94F3-14D8E5038AB6}" type="datetimeFigureOut">
               <a:rPr lang="en-US" smtClean="0"/>
-              <a:t>9/4/23</a:t>
+              <a:t>9/3/25</a:t>
             </a:fld>
             <a:endParaRPr lang="en-US"/>
           </a:p>
@@ -531,7 +532,7 @@
           <a:bodyPr/>
           <a:lstStyle/>
           <a:p>
-            <a:endParaRPr lang="da-DK"/>
+            <a:endParaRPr lang="en-DK" dirty="0"/>
           </a:p>
         </p:txBody>
       </p:sp>
@@ -542,7 +543,7 @@
             <a:spLocks noGrp="1"/>
           </p:cNvSpPr>
           <p:nvPr>
-            <p:ph type="sldNum" sz="quarter" idx="10"/>
+            <p:ph type="sldNum" sz="quarter" idx="5"/>
           </p:nvPr>
         </p:nvSpPr>
         <p:spPr/>
@@ -561,7 +562,7 @@
     </p:spTree>
     <p:extLst>
       <p:ext uri="{BB962C8B-B14F-4D97-AF65-F5344CB8AC3E}">
-        <p14:creationId xmlns:p14="http://schemas.microsoft.com/office/powerpoint/2010/main" val="3031655682"/>
+        <p14:creationId xmlns:p14="http://schemas.microsoft.com/office/powerpoint/2010/main" val="3179102327"/>
       </p:ext>
     </p:extLst>
   </p:cSld>
@@ -867,7 +868,7 @@
           <a:bodyPr/>
           <a:lstStyle/>
           <a:p>
-            <a:endParaRPr lang="da-DK"/>
+            <a:endParaRPr lang="da-DK" dirty="0"/>
           </a:p>
         </p:txBody>
       </p:sp>
@@ -889,6 +890,90 @@
             <a:fld id="{D4B42F7E-C03E-4A75-829B-A53EDB2B71A1}" type="slidenum">
               <a:rPr lang="en-US" smtClean="0"/>
               <a:t>13</a:t>
+            </a:fld>
+            <a:endParaRPr lang="en-US"/>
+          </a:p>
+        </p:txBody>
+      </p:sp>
+    </p:spTree>
+    <p:extLst>
+      <p:ext uri="{BB962C8B-B14F-4D97-AF65-F5344CB8AC3E}">
+        <p14:creationId xmlns:p14="http://schemas.microsoft.com/office/powerpoint/2010/main" val="2560467160"/>
+      </p:ext>
+    </p:extLst>
+  </p:cSld>
+  <p:clrMapOvr>
+    <a:masterClrMapping/>
+  </p:clrMapOvr>
+</p:notes>
+</file>
+
+<file path=ppt/notesSlides/notesSlide14.xml><?xml version="1.0" encoding="utf-8"?>
+<p:notes xmlns:a="http://schemas.openxmlformats.org/drawingml/2006/main" xmlns:r="http://schemas.openxmlformats.org/officeDocument/2006/relationships" xmlns:p="http://schemas.openxmlformats.org/presentationml/2006/main">
+  <p:cSld>
+    <p:spTree>
+      <p:nvGrpSpPr>
+        <p:cNvPr id="1" name=""/>
+        <p:cNvGrpSpPr/>
+        <p:nvPr/>
+      </p:nvGrpSpPr>
+      <p:grpSpPr>
+        <a:xfrm>
+          <a:off x="0" y="0"/>
+          <a:ext cx="0" cy="0"/>
+          <a:chOff x="0" y="0"/>
+          <a:chExt cx="0" cy="0"/>
+        </a:xfrm>
+      </p:grpSpPr>
+      <p:sp>
+        <p:nvSpPr>
+          <p:cNvPr id="2" name="Slide Image Placeholder 1"/>
+          <p:cNvSpPr>
+            <a:spLocks noGrp="1" noRot="1" noChangeAspect="1"/>
+          </p:cNvSpPr>
+          <p:nvPr>
+            <p:ph type="sldImg"/>
+          </p:nvPr>
+        </p:nvSpPr>
+        <p:spPr/>
+      </p:sp>
+      <p:sp>
+        <p:nvSpPr>
+          <p:cNvPr id="3" name="Notes Placeholder 2"/>
+          <p:cNvSpPr>
+            <a:spLocks noGrp="1"/>
+          </p:cNvSpPr>
+          <p:nvPr>
+            <p:ph type="body" idx="1"/>
+          </p:nvPr>
+        </p:nvSpPr>
+        <p:spPr/>
+        <p:txBody>
+          <a:bodyPr/>
+          <a:lstStyle/>
+          <a:p>
+            <a:endParaRPr lang="da-DK"/>
+          </a:p>
+        </p:txBody>
+      </p:sp>
+      <p:sp>
+        <p:nvSpPr>
+          <p:cNvPr id="4" name="Slide Number Placeholder 3"/>
+          <p:cNvSpPr>
+            <a:spLocks noGrp="1"/>
+          </p:cNvSpPr>
+          <p:nvPr>
+            <p:ph type="sldNum" sz="quarter" idx="10"/>
+          </p:nvPr>
+        </p:nvSpPr>
+        <p:spPr/>
+        <p:txBody>
+          <a:bodyPr/>
+          <a:lstStyle/>
+          <a:p>
+            <a:fld id="{D4B42F7E-C03E-4A75-829B-A53EDB2B71A1}" type="slidenum">
+              <a:rPr lang="en-US" smtClean="0"/>
+              <a:t>14</a:t>
             </a:fld>
             <a:endParaRPr lang="en-US"/>
           </a:p>
@@ -951,7 +1036,7 @@
           <a:bodyPr/>
           <a:lstStyle/>
           <a:p>
-            <a:endParaRPr lang="da-DK" dirty="0"/>
+            <a:endParaRPr lang="da-DK"/>
           </a:p>
         </p:txBody>
       </p:sp>
@@ -981,7 +1066,7 @@
     </p:spTree>
     <p:extLst>
       <p:ext uri="{BB962C8B-B14F-4D97-AF65-F5344CB8AC3E}">
-        <p14:creationId xmlns:p14="http://schemas.microsoft.com/office/powerpoint/2010/main" val="2560467160"/>
+        <p14:creationId xmlns:p14="http://schemas.microsoft.com/office/powerpoint/2010/main" val="3031655682"/>
       </p:ext>
     </p:extLst>
   </p:cSld>
@@ -2617,66 +2702,117 @@
       </p:grpSpPr>
       <p:sp>
         <p:nvSpPr>
-          <p:cNvPr id="4" name="Title 3"/>
+          <p:cNvPr id="4" name="Title 3">
+            <a:extLst>
+              <a:ext uri="{FF2B5EF4-FFF2-40B4-BE49-F238E27FC236}">
+                <a16:creationId xmlns:a16="http://schemas.microsoft.com/office/drawing/2014/main" id="{D02CDF5C-8C54-E90B-88D2-D5210A431404}"/>
+              </a:ext>
+            </a:extLst>
+          </p:cNvPr>
           <p:cNvSpPr>
             <a:spLocks noGrp="1"/>
           </p:cNvSpPr>
           <p:nvPr>
-            <p:ph type="ctrTitle"/>
+            <p:ph type="title"/>
           </p:nvPr>
         </p:nvSpPr>
-        <p:spPr>
-          <a:xfrm>
-            <a:off x="685800" y="1390077"/>
-            <a:ext cx="7772400" cy="1470025"/>
-          </a:xfrm>
-        </p:spPr>
+        <p:spPr/>
         <p:txBody>
-          <a:bodyPr>
-            <a:noAutofit/>
-          </a:bodyPr>
+          <a:bodyPr/>
           <a:lstStyle/>
           <a:p>
-            <a:r>
-              <a:rPr lang="da-DK" sz="4800" dirty="0"/>
-              <a:t>The Open-</a:t>
-            </a:r>
-            <a:r>
-              <a:rPr lang="da-DK" sz="4800" dirty="0" err="1"/>
-              <a:t>Closed</a:t>
-            </a:r>
-            <a:r>
-              <a:rPr lang="da-DK" sz="4800" dirty="0"/>
-              <a:t> </a:t>
-            </a:r>
-            <a:r>
-              <a:rPr lang="da-DK" sz="4800" dirty="0" err="1"/>
-              <a:t>Principle</a:t>
-            </a:r>
-            <a:r>
-              <a:rPr lang="da-DK" sz="4800" dirty="0"/>
-              <a:t> (OCP)</a:t>
-            </a:r>
-            <a:endParaRPr lang="en-US" sz="4800" dirty="0"/>
+            <a:endParaRPr lang="en-DK" dirty="0"/>
           </a:p>
         </p:txBody>
       </p:sp>
+      <p:pic>
+        <p:nvPicPr>
+          <p:cNvPr id="1026" name="Picture 2" descr="Product Backlog Refinement: Make the Most of It">
+            <a:extLst>
+              <a:ext uri="{FF2B5EF4-FFF2-40B4-BE49-F238E27FC236}">
+                <a16:creationId xmlns:a16="http://schemas.microsoft.com/office/drawing/2014/main" id="{7A3509C7-EAED-D75A-46CB-A767904F82EC}"/>
+              </a:ext>
+            </a:extLst>
+          </p:cNvPr>
+          <p:cNvPicPr>
+            <a:picLocks noChangeAspect="1" noChangeArrowheads="1"/>
+          </p:cNvPicPr>
+          <p:nvPr/>
+        </p:nvPicPr>
+        <p:blipFill>
+          <a:blip r:embed="rId3">
+            <a:extLst>
+              <a:ext uri="{28A0092B-C50C-407E-A947-70E740481C1C}">
+                <a14:useLocalDpi xmlns:a14="http://schemas.microsoft.com/office/drawing/2010/main" val="0"/>
+              </a:ext>
+            </a:extLst>
+          </a:blip>
+          <a:srcRect/>
+          <a:stretch>
+            <a:fillRect/>
+          </a:stretch>
+        </p:blipFill>
+        <p:spPr bwMode="auto">
+          <a:xfrm>
+            <a:off x="514350" y="2165350"/>
+            <a:ext cx="8115300" cy="2527300"/>
+          </a:xfrm>
+          <a:prstGeom prst="rect">
+            <a:avLst/>
+          </a:prstGeom>
+          <a:noFill/>
+          <a:extLst>
+            <a:ext uri="{909E8E84-426E-40DD-AFC4-6F175D3DCCD1}">
+              <a14:hiddenFill xmlns:a14="http://schemas.microsoft.com/office/drawing/2010/main">
+                <a:solidFill>
+                  <a:srgbClr val="FFFFFF"/>
+                </a:solidFill>
+              </a14:hiddenFill>
+            </a:ext>
+          </a:extLst>
+        </p:spPr>
+      </p:pic>
+    </p:spTree>
+    <p:extLst>
+      <p:ext uri="{BB962C8B-B14F-4D97-AF65-F5344CB8AC3E}">
+        <p14:creationId xmlns:p14="http://schemas.microsoft.com/office/powerpoint/2010/main" val="2856585967"/>
+      </p:ext>
+    </p:extLst>
+  </p:cSld>
+  <p:clrMapOvr>
+    <a:masterClrMapping/>
+  </p:clrMapOvr>
+</p:sld>
+</file>
+
+<file path=ppt/slides/slide10.xml><?xml version="1.0" encoding="utf-8"?>
+<p:sld xmlns:a="http://schemas.openxmlformats.org/drawingml/2006/main" xmlns:r="http://schemas.openxmlformats.org/officeDocument/2006/relationships" xmlns:p="http://schemas.openxmlformats.org/presentationml/2006/main">
+  <p:cSld>
+    <p:spTree>
+      <p:nvGrpSpPr>
+        <p:cNvPr id="1" name=""/>
+        <p:cNvGrpSpPr/>
+        <p:nvPr/>
+      </p:nvGrpSpPr>
+      <p:grpSpPr>
+        <a:xfrm>
+          <a:off x="0" y="0"/>
+          <a:ext cx="0" cy="0"/>
+          <a:chOff x="0" y="0"/>
+          <a:chExt cx="0" cy="0"/>
+        </a:xfrm>
+      </p:grpSpPr>
       <p:sp>
         <p:nvSpPr>
-          <p:cNvPr id="5" name="Subtitle 4"/>
+          <p:cNvPr id="2" name="Title 1"/>
           <p:cNvSpPr>
             <a:spLocks noGrp="1"/>
           </p:cNvSpPr>
           <p:nvPr>
-            <p:ph type="subTitle" idx="1"/>
+            <p:ph type="title"/>
           </p:nvPr>
         </p:nvSpPr>
-        <p:spPr>
-          <a:xfrm>
-            <a:off x="467544" y="5460156"/>
-            <a:ext cx="8352928" cy="1017587"/>
-          </a:xfrm>
-        </p:spPr>
+        <p:spPr/>
         <p:txBody>
           <a:bodyPr>
             <a:normAutofit/>
@@ -2684,70 +2820,285 @@
           <a:lstStyle/>
           <a:p>
             <a:r>
-              <a:rPr lang="en-US" sz="2400" i="1" dirty="0"/>
-              <a:t>“The critical design tool for software development</a:t>
-            </a:r>
-          </a:p>
-          <a:p>
-            <a:r>
-              <a:rPr lang="en-US" sz="2400" i="1" dirty="0"/>
-              <a:t>is a mind well educated in design principles”</a:t>
+              <a:rPr lang="en-US" dirty="0"/>
+              <a:t>The OCP newbie dialog II</a:t>
             </a:r>
           </a:p>
         </p:txBody>
       </p:sp>
-      <p:pic>
-        <p:nvPicPr>
-          <p:cNvPr id="2" name="Picture 1"/>
-          <p:cNvPicPr>
-            <a:picLocks noChangeAspect="1"/>
-          </p:cNvPicPr>
+      <p:sp>
+        <p:nvSpPr>
+          <p:cNvPr id="3" name="Rounded Rectangular Callout 2"/>
+          <p:cNvSpPr/>
           <p:nvPr/>
-        </p:nvPicPr>
-        <p:blipFill>
-          <a:blip r:embed="rId3"/>
-          <a:stretch>
-            <a:fillRect/>
-          </a:stretch>
-        </p:blipFill>
+        </p:nvSpPr>
         <p:spPr>
           <a:xfrm>
-            <a:off x="6588224" y="3005487"/>
-            <a:ext cx="1497790" cy="2223713"/>
+            <a:off x="611560" y="1628799"/>
+            <a:ext cx="4104456" cy="592923"/>
           </a:xfrm>
-          <a:prstGeom prst="rect">
-            <a:avLst/>
+          <a:prstGeom prst="wedgeRoundRectCallout">
+            <a:avLst>
+              <a:gd name="adj1" fmla="val -50248"/>
+              <a:gd name="adj2" fmla="val 104829"/>
+              <a:gd name="adj3" fmla="val 16667"/>
+            </a:avLst>
           </a:prstGeom>
         </p:spPr>
-      </p:pic>
-      <p:pic>
-        <p:nvPicPr>
-          <p:cNvPr id="6" name="Picture 5"/>
-          <p:cNvPicPr>
-            <a:picLocks noChangeAspect="1"/>
-          </p:cNvPicPr>
+        <p:style>
+          <a:lnRef idx="2">
+            <a:schemeClr val="accent1">
+              <a:shade val="50000"/>
+            </a:schemeClr>
+          </a:lnRef>
+          <a:fillRef idx="1">
+            <a:schemeClr val="accent1"/>
+          </a:fillRef>
+          <a:effectRef idx="0">
+            <a:schemeClr val="accent1"/>
+          </a:effectRef>
+          <a:fontRef idx="minor">
+            <a:schemeClr val="lt1"/>
+          </a:fontRef>
+        </p:style>
+        <p:txBody>
+          <a:bodyPr rtlCol="0" anchor="ctr"/>
+          <a:lstStyle/>
+          <a:p>
+            <a:pPr defTabSz="738188"/>
+            <a:r>
+              <a:rPr lang="en-US" sz="1600" i="1" dirty="0"/>
+              <a:t>Damn…what went wrong? I didn’t want to change </a:t>
+            </a:r>
+            <a:r>
+              <a:rPr lang="en-US" sz="1400" b="1" i="1" dirty="0" err="1">
+                <a:latin typeface="Consolas" panose="020B0609020204030204" pitchFamily="49" charset="0"/>
+                <a:cs typeface="Consolas" panose="020B0609020204030204" pitchFamily="49" charset="0"/>
+              </a:rPr>
+              <a:t>TextEditor</a:t>
+            </a:r>
+            <a:r>
+              <a:rPr lang="en-US" sz="1600" i="1" dirty="0"/>
+              <a:t>, only the printer it uses!</a:t>
+            </a:r>
+          </a:p>
+        </p:txBody>
+      </p:sp>
+      <p:sp>
+        <p:nvSpPr>
+          <p:cNvPr id="7" name="Rounded Rectangular Callout 6"/>
+          <p:cNvSpPr/>
           <p:nvPr/>
-        </p:nvPicPr>
-        <p:blipFill>
-          <a:blip r:embed="rId3"/>
-          <a:stretch>
-            <a:fillRect/>
-          </a:stretch>
-        </p:blipFill>
+        </p:nvSpPr>
         <p:spPr>
           <a:xfrm>
-            <a:off x="1331640" y="3005487"/>
-            <a:ext cx="1497790" cy="2223713"/>
+            <a:off x="2915816" y="2564904"/>
+            <a:ext cx="5400599" cy="881371"/>
           </a:xfrm>
-          <a:prstGeom prst="rect">
-            <a:avLst/>
+          <a:prstGeom prst="wedgeRoundRectCallout">
+            <a:avLst>
+              <a:gd name="adj1" fmla="val 51223"/>
+              <a:gd name="adj2" fmla="val 124809"/>
+              <a:gd name="adj3" fmla="val 16667"/>
+            </a:avLst>
+          </a:prstGeom>
+          <a:solidFill>
+            <a:schemeClr val="accent3"/>
+          </a:solidFill>
+          <a:ln>
+            <a:solidFill>
+              <a:srgbClr val="00B050"/>
+            </a:solidFill>
+          </a:ln>
+        </p:spPr>
+        <p:style>
+          <a:lnRef idx="2">
+            <a:schemeClr val="accent1">
+              <a:shade val="50000"/>
+            </a:schemeClr>
+          </a:lnRef>
+          <a:fillRef idx="1">
+            <a:schemeClr val="accent1"/>
+          </a:fillRef>
+          <a:effectRef idx="0">
+            <a:schemeClr val="accent1"/>
+          </a:effectRef>
+          <a:fontRef idx="minor">
+            <a:schemeClr val="lt1"/>
+          </a:fontRef>
+        </p:style>
+        <p:txBody>
+          <a:bodyPr rtlCol="0" anchor="ctr"/>
+          <a:lstStyle/>
+          <a:p>
+            <a:pPr defTabSz="738188"/>
+            <a:r>
+              <a:rPr lang="en-US" sz="1400" b="1" i="1" dirty="0" err="1">
+                <a:latin typeface="Consolas" panose="020B0609020204030204" pitchFamily="49" charset="0"/>
+                <a:cs typeface="Consolas" panose="020B0609020204030204" pitchFamily="49" charset="0"/>
+              </a:rPr>
+              <a:t>TextEditor</a:t>
+            </a:r>
+            <a:r>
+              <a:rPr lang="en-US" sz="1400" b="1" i="1" dirty="0">
+                <a:latin typeface="Consolas" panose="020B0609020204030204" pitchFamily="49" charset="0"/>
+                <a:cs typeface="Consolas" panose="020B0609020204030204" pitchFamily="49" charset="0"/>
+              </a:rPr>
+              <a:t> </a:t>
+            </a:r>
+            <a:r>
+              <a:rPr lang="en-US" sz="1600" i="1" dirty="0"/>
+              <a:t>was too tightly coupled to </a:t>
+            </a:r>
+            <a:r>
+              <a:rPr lang="en-US" sz="1400" b="1" i="1" dirty="0">
+                <a:latin typeface="Consolas" panose="020B0609020204030204" pitchFamily="49" charset="0"/>
+                <a:cs typeface="Consolas" panose="020B0609020204030204" pitchFamily="49" charset="0"/>
+              </a:rPr>
+              <a:t>Printer</a:t>
+            </a:r>
+            <a:r>
+              <a:rPr lang="en-US" sz="1600" i="1" dirty="0"/>
+              <a:t>, therefore extensions to the printer used rippled through –</a:t>
+            </a:r>
+            <a:r>
+              <a:rPr lang="en-US" sz="1400" b="1" i="1" dirty="0" err="1">
+                <a:latin typeface="Consolas" panose="020B0609020204030204" pitchFamily="49" charset="0"/>
+                <a:cs typeface="Consolas" panose="020B0609020204030204" pitchFamily="49" charset="0"/>
+              </a:rPr>
+              <a:t>TextEditor</a:t>
+            </a:r>
+            <a:r>
+              <a:rPr lang="en-US" sz="1400" b="1" i="1" dirty="0">
+                <a:latin typeface="Consolas" panose="020B0609020204030204" pitchFamily="49" charset="0"/>
+                <a:cs typeface="Consolas" panose="020B0609020204030204" pitchFamily="49" charset="0"/>
+              </a:rPr>
+              <a:t> </a:t>
+            </a:r>
+            <a:r>
+              <a:rPr lang="en-US" sz="1600" i="1" dirty="0"/>
+              <a:t>was not closed for modifications when changes were needed…</a:t>
+            </a:r>
+          </a:p>
+        </p:txBody>
+      </p:sp>
+      <p:sp>
+        <p:nvSpPr>
+          <p:cNvPr id="8" name="Rounded Rectangular Callout 7"/>
+          <p:cNvSpPr/>
+          <p:nvPr/>
+        </p:nvSpPr>
+        <p:spPr>
+          <a:xfrm>
+            <a:off x="609554" y="3879985"/>
+            <a:ext cx="5690637" cy="826222"/>
+          </a:xfrm>
+          <a:prstGeom prst="wedgeRoundRectCallout">
+            <a:avLst>
+              <a:gd name="adj1" fmla="val -50248"/>
+              <a:gd name="adj2" fmla="val 104829"/>
+              <a:gd name="adj3" fmla="val 16667"/>
+            </a:avLst>
           </a:prstGeom>
         </p:spPr>
-      </p:pic>
+        <p:style>
+          <a:lnRef idx="2">
+            <a:schemeClr val="accent1">
+              <a:shade val="50000"/>
+            </a:schemeClr>
+          </a:lnRef>
+          <a:fillRef idx="1">
+            <a:schemeClr val="accent1"/>
+          </a:fillRef>
+          <a:effectRef idx="0">
+            <a:schemeClr val="accent1"/>
+          </a:effectRef>
+          <a:fontRef idx="minor">
+            <a:schemeClr val="lt1"/>
+          </a:fontRef>
+        </p:style>
+        <p:txBody>
+          <a:bodyPr rtlCol="0" anchor="ctr"/>
+          <a:lstStyle/>
+          <a:p>
+            <a:pPr defTabSz="738188"/>
+            <a:r>
+              <a:rPr lang="en-US" sz="1600" i="1" dirty="0"/>
+              <a:t>But how could I ever avoid that? It is a whole new printer I am trying to use. And what if the supported printer is changed again? Or if we need to support several printers?</a:t>
+            </a:r>
+          </a:p>
+        </p:txBody>
+      </p:sp>
+      <p:sp>
+        <p:nvSpPr>
+          <p:cNvPr id="10" name="Rounded Rectangular Callout 9"/>
+          <p:cNvSpPr/>
+          <p:nvPr/>
+        </p:nvSpPr>
+        <p:spPr>
+          <a:xfrm>
+            <a:off x="4064612" y="5157192"/>
+            <a:ext cx="4217195" cy="864096"/>
+          </a:xfrm>
+          <a:prstGeom prst="wedgeRoundRectCallout">
+            <a:avLst>
+              <a:gd name="adj1" fmla="val 52474"/>
+              <a:gd name="adj2" fmla="val 69863"/>
+              <a:gd name="adj3" fmla="val 16667"/>
+            </a:avLst>
+          </a:prstGeom>
+          <a:solidFill>
+            <a:schemeClr val="accent3"/>
+          </a:solidFill>
+          <a:ln>
+            <a:solidFill>
+              <a:srgbClr val="00B050"/>
+            </a:solidFill>
+          </a:ln>
+        </p:spPr>
+        <p:style>
+          <a:lnRef idx="2">
+            <a:schemeClr val="accent1">
+              <a:shade val="50000"/>
+            </a:schemeClr>
+          </a:lnRef>
+          <a:fillRef idx="1">
+            <a:schemeClr val="accent1"/>
+          </a:fillRef>
+          <a:effectRef idx="0">
+            <a:schemeClr val="accent1"/>
+          </a:effectRef>
+          <a:fontRef idx="minor">
+            <a:schemeClr val="lt1"/>
+          </a:fontRef>
+        </p:style>
+        <p:txBody>
+          <a:bodyPr rtlCol="0" anchor="ctr"/>
+          <a:lstStyle/>
+          <a:p>
+            <a:pPr defTabSz="738188"/>
+            <a:r>
+              <a:rPr lang="en-US" sz="1600" i="1" dirty="0"/>
+              <a:t>We could apply OCP and make </a:t>
+            </a:r>
+            <a:r>
+              <a:rPr lang="en-US" sz="1400" b="1" i="1" dirty="0" err="1">
+                <a:latin typeface="Consolas" panose="020B0609020204030204" pitchFamily="49" charset="0"/>
+                <a:cs typeface="Consolas" panose="020B0609020204030204" pitchFamily="49" charset="0"/>
+              </a:rPr>
+              <a:t>TextEditor</a:t>
+            </a:r>
+            <a:r>
+              <a:rPr lang="en-US" sz="1600" i="1" dirty="0"/>
+              <a:t> open for extension (the new printer or printers) but closed for modifications…let me show you!</a:t>
+            </a:r>
+          </a:p>
+        </p:txBody>
+      </p:sp>
     </p:spTree>
     <p:extLst>
       <p:ext uri="{BB962C8B-B14F-4D97-AF65-F5344CB8AC3E}">
-        <p14:creationId xmlns:p14="http://schemas.microsoft.com/office/powerpoint/2010/main" val="1970800740"/>
+        <p14:creationId xmlns:p14="http://schemas.microsoft.com/office/powerpoint/2010/main" val="1408931691"/>
       </p:ext>
     </p:extLst>
   </p:cSld>
@@ -2775,7 +3126,7 @@
                             </p:stCondLst>
                             <p:childTnLst>
                               <p:par>
-                                <p:cTn id="5" presetID="1" presetClass="entr" presetSubtype="0" fill="hold" nodeType="clickEffect">
+                                <p:cTn id="5" presetID="1" presetClass="entr" presetSubtype="0" fill="hold" grpId="0" nodeType="clickEffect">
                                   <p:stCondLst>
                                     <p:cond delay="0"/>
                                   </p:stCondLst>
@@ -2788,7 +3139,7 @@
                                           </p:stCondLst>
                                         </p:cTn>
                                         <p:tgtEl>
-                                          <p:spTgt spid="6"/>
+                                          <p:spTgt spid="7"/>
                                         </p:tgtEl>
                                         <p:attrNameLst>
                                           <p:attrName>style.visibility</p:attrName>
@@ -2801,21 +3152,84 @@
                                   </p:childTnLst>
                                 </p:cTn>
                               </p:par>
+                            </p:childTnLst>
+                          </p:cTn>
+                        </p:par>
+                      </p:childTnLst>
+                    </p:cTn>
+                  </p:par>
+                  <p:par>
+                    <p:cTn id="7" fill="hold">
+                      <p:stCondLst>
+                        <p:cond delay="indefinite"/>
+                      </p:stCondLst>
+                      <p:childTnLst>
+                        <p:par>
+                          <p:cTn id="8" fill="hold">
+                            <p:stCondLst>
+                              <p:cond delay="0"/>
+                            </p:stCondLst>
+                            <p:childTnLst>
                               <p:par>
-                                <p:cTn id="7" presetID="1" presetClass="entr" presetSubtype="0" fill="hold" nodeType="withEffect">
+                                <p:cTn id="9" presetID="1" presetClass="entr" presetSubtype="0" fill="hold" grpId="0" nodeType="clickEffect">
                                   <p:stCondLst>
                                     <p:cond delay="0"/>
                                   </p:stCondLst>
                                   <p:childTnLst>
                                     <p:set>
                                       <p:cBhvr>
-                                        <p:cTn id="8" dur="1" fill="hold">
+                                        <p:cTn id="10" dur="1" fill="hold">
                                           <p:stCondLst>
                                             <p:cond delay="0"/>
                                           </p:stCondLst>
                                         </p:cTn>
                                         <p:tgtEl>
-                                          <p:spTgt spid="2"/>
+                                          <p:spTgt spid="8"/>
+                                        </p:tgtEl>
+                                        <p:attrNameLst>
+                                          <p:attrName>style.visibility</p:attrName>
+                                        </p:attrNameLst>
+                                      </p:cBhvr>
+                                      <p:to>
+                                        <p:strVal val="visible"/>
+                                      </p:to>
+                                    </p:set>
+                                  </p:childTnLst>
+                                </p:cTn>
+                              </p:par>
+                            </p:childTnLst>
+                          </p:cTn>
+                        </p:par>
+                      </p:childTnLst>
+                    </p:cTn>
+                  </p:par>
+                  <p:par>
+                    <p:cTn id="11" fill="hold">
+                      <p:stCondLst>
+                        <p:cond delay="indefinite"/>
+                      </p:stCondLst>
+                      <p:childTnLst>
+                        <p:par>
+                          <p:cTn id="12" fill="hold">
+                            <p:stCondLst>
+                              <p:cond delay="0"/>
+                            </p:stCondLst>
+                            <p:childTnLst>
+                              <p:par>
+                                <p:cTn id="13" presetID="1" presetClass="entr" presetSubtype="0" fill="hold" grpId="0" nodeType="clickEffect">
+                                  <p:stCondLst>
+                                    <p:cond delay="0"/>
+                                  </p:stCondLst>
+                                  <p:childTnLst>
+                                    <p:set>
+                                      <p:cBhvr>
+                                        <p:cTn id="14" dur="1" fill="hold">
+                                          <p:stCondLst>
+                                            <p:cond delay="0"/>
+                                          </p:stCondLst>
+                                        </p:cTn>
+                                        <p:tgtEl>
+                                          <p:spTgt spid="10"/>
                                         </p:tgtEl>
                                         <p:attrNameLst>
                                           <p:attrName>style.visibility</p:attrName>
@@ -2855,11 +3269,16 @@
         </p:cTn>
       </p:par>
     </p:tnLst>
+    <p:bldLst>
+      <p:bldP spid="7" grpId="0" animBg="1"/>
+      <p:bldP spid="8" grpId="0" animBg="1"/>
+      <p:bldP spid="10" grpId="0" animBg="1"/>
+    </p:bldLst>
   </p:timing>
 </p:sld>
 </file>
 
-<file path=ppt/slides/slide10.xml><?xml version="1.0" encoding="utf-8"?>
+<file path=ppt/slides/slide11.xml><?xml version="1.0" encoding="utf-8"?>
 <p:sld xmlns:a="http://schemas.openxmlformats.org/drawingml/2006/main" xmlns:r="http://schemas.openxmlformats.org/officeDocument/2006/relationships" xmlns:p="http://schemas.openxmlformats.org/presentationml/2006/main">
   <p:cSld>
     <p:spTree>
@@ -4133,7 +4552,7 @@
 </p:sld>
 </file>
 
-<file path=ppt/slides/slide11.xml><?xml version="1.0" encoding="utf-8"?>
+<file path=ppt/slides/slide12.xml><?xml version="1.0" encoding="utf-8"?>
 <p:sld xmlns:a="http://schemas.openxmlformats.org/drawingml/2006/main" xmlns:r="http://schemas.openxmlformats.org/officeDocument/2006/relationships" xmlns:p="http://schemas.openxmlformats.org/presentationml/2006/main">
   <p:cSld>
     <p:spTree>
@@ -5922,7 +6341,7 @@
 </p:sld>
 </file>
 
-<file path=ppt/slides/slide12.xml><?xml version="1.0" encoding="utf-8"?>
+<file path=ppt/slides/slide13.xml><?xml version="1.0" encoding="utf-8"?>
 <p:sld xmlns:a="http://schemas.openxmlformats.org/drawingml/2006/main" xmlns:r="http://schemas.openxmlformats.org/officeDocument/2006/relationships" xmlns:p="http://schemas.openxmlformats.org/presentationml/2006/main">
   <p:cSld>
     <p:spTree>
@@ -6015,7 +6434,7 @@
 </p:sld>
 </file>
 
-<file path=ppt/slides/slide13.xml><?xml version="1.0" encoding="utf-8"?>
+<file path=ppt/slides/slide14.xml><?xml version="1.0" encoding="utf-8"?>
 <p:sld xmlns:a="http://schemas.openxmlformats.org/drawingml/2006/main" xmlns:r="http://schemas.openxmlformats.org/officeDocument/2006/relationships" xmlns:p="http://schemas.openxmlformats.org/presentationml/2006/main">
   <p:cSld>
     <p:spTree>
@@ -6132,6 +6551,267 @@
 </file>
 
 <file path=ppt/slides/slide2.xml><?xml version="1.0" encoding="utf-8"?>
+<p:sld xmlns:a="http://schemas.openxmlformats.org/drawingml/2006/main" xmlns:r="http://schemas.openxmlformats.org/officeDocument/2006/relationships" xmlns:p="http://schemas.openxmlformats.org/presentationml/2006/main">
+  <p:cSld>
+    <p:spTree>
+      <p:nvGrpSpPr>
+        <p:cNvPr id="1" name=""/>
+        <p:cNvGrpSpPr/>
+        <p:nvPr/>
+      </p:nvGrpSpPr>
+      <p:grpSpPr>
+        <a:xfrm>
+          <a:off x="0" y="0"/>
+          <a:ext cx="0" cy="0"/>
+          <a:chOff x="0" y="0"/>
+          <a:chExt cx="0" cy="0"/>
+        </a:xfrm>
+      </p:grpSpPr>
+      <p:sp>
+        <p:nvSpPr>
+          <p:cNvPr id="4" name="Title 3"/>
+          <p:cNvSpPr>
+            <a:spLocks noGrp="1"/>
+          </p:cNvSpPr>
+          <p:nvPr>
+            <p:ph type="ctrTitle"/>
+          </p:nvPr>
+        </p:nvSpPr>
+        <p:spPr>
+          <a:xfrm>
+            <a:off x="685800" y="1390077"/>
+            <a:ext cx="7772400" cy="1470025"/>
+          </a:xfrm>
+        </p:spPr>
+        <p:txBody>
+          <a:bodyPr>
+            <a:noAutofit/>
+          </a:bodyPr>
+          <a:lstStyle/>
+          <a:p>
+            <a:r>
+              <a:rPr lang="da-DK" sz="4800" dirty="0"/>
+              <a:t>The Open-</a:t>
+            </a:r>
+            <a:r>
+              <a:rPr lang="da-DK" sz="4800" dirty="0" err="1"/>
+              <a:t>Closed</a:t>
+            </a:r>
+            <a:r>
+              <a:rPr lang="da-DK" sz="4800" dirty="0"/>
+              <a:t> </a:t>
+            </a:r>
+            <a:r>
+              <a:rPr lang="da-DK" sz="4800" dirty="0" err="1"/>
+              <a:t>Principle</a:t>
+            </a:r>
+            <a:r>
+              <a:rPr lang="da-DK" sz="4800" dirty="0"/>
+              <a:t> (OCP)</a:t>
+            </a:r>
+            <a:endParaRPr lang="en-US" sz="4800" dirty="0"/>
+          </a:p>
+        </p:txBody>
+      </p:sp>
+      <p:sp>
+        <p:nvSpPr>
+          <p:cNvPr id="5" name="Subtitle 4"/>
+          <p:cNvSpPr>
+            <a:spLocks noGrp="1"/>
+          </p:cNvSpPr>
+          <p:nvPr>
+            <p:ph type="subTitle" idx="1"/>
+          </p:nvPr>
+        </p:nvSpPr>
+        <p:spPr>
+          <a:xfrm>
+            <a:off x="467544" y="5460156"/>
+            <a:ext cx="8352928" cy="1017587"/>
+          </a:xfrm>
+        </p:spPr>
+        <p:txBody>
+          <a:bodyPr>
+            <a:normAutofit/>
+          </a:bodyPr>
+          <a:lstStyle/>
+          <a:p>
+            <a:r>
+              <a:rPr lang="en-US" sz="2400" i="1" dirty="0"/>
+              <a:t>“The critical design tool for software development</a:t>
+            </a:r>
+          </a:p>
+          <a:p>
+            <a:r>
+              <a:rPr lang="en-US" sz="2400" i="1" dirty="0"/>
+              <a:t>is a mind well educated in design principles”</a:t>
+            </a:r>
+          </a:p>
+        </p:txBody>
+      </p:sp>
+      <p:pic>
+        <p:nvPicPr>
+          <p:cNvPr id="2" name="Picture 1"/>
+          <p:cNvPicPr>
+            <a:picLocks noChangeAspect="1"/>
+          </p:cNvPicPr>
+          <p:nvPr/>
+        </p:nvPicPr>
+        <p:blipFill>
+          <a:blip r:embed="rId3"/>
+          <a:stretch>
+            <a:fillRect/>
+          </a:stretch>
+        </p:blipFill>
+        <p:spPr>
+          <a:xfrm>
+            <a:off x="6588224" y="3005487"/>
+            <a:ext cx="1497790" cy="2223713"/>
+          </a:xfrm>
+          <a:prstGeom prst="rect">
+            <a:avLst/>
+          </a:prstGeom>
+        </p:spPr>
+      </p:pic>
+      <p:pic>
+        <p:nvPicPr>
+          <p:cNvPr id="6" name="Picture 5"/>
+          <p:cNvPicPr>
+            <a:picLocks noChangeAspect="1"/>
+          </p:cNvPicPr>
+          <p:nvPr/>
+        </p:nvPicPr>
+        <p:blipFill>
+          <a:blip r:embed="rId3"/>
+          <a:stretch>
+            <a:fillRect/>
+          </a:stretch>
+        </p:blipFill>
+        <p:spPr>
+          <a:xfrm>
+            <a:off x="1331640" y="3005487"/>
+            <a:ext cx="1497790" cy="2223713"/>
+          </a:xfrm>
+          <a:prstGeom prst="rect">
+            <a:avLst/>
+          </a:prstGeom>
+        </p:spPr>
+      </p:pic>
+    </p:spTree>
+    <p:extLst>
+      <p:ext uri="{BB962C8B-B14F-4D97-AF65-F5344CB8AC3E}">
+        <p14:creationId xmlns:p14="http://schemas.microsoft.com/office/powerpoint/2010/main" val="1970800740"/>
+      </p:ext>
+    </p:extLst>
+  </p:cSld>
+  <p:clrMapOvr>
+    <a:masterClrMapping/>
+  </p:clrMapOvr>
+  <p:timing>
+    <p:tnLst>
+      <p:par>
+        <p:cTn id="1" dur="indefinite" restart="never" nodeType="tmRoot">
+          <p:childTnLst>
+            <p:seq concurrent="1" nextAc="seek">
+              <p:cTn id="2" dur="indefinite" nodeType="mainSeq">
+                <p:childTnLst>
+                  <p:par>
+                    <p:cTn id="3" fill="hold">
+                      <p:stCondLst>
+                        <p:cond delay="indefinite"/>
+                      </p:stCondLst>
+                      <p:childTnLst>
+                        <p:par>
+                          <p:cTn id="4" fill="hold">
+                            <p:stCondLst>
+                              <p:cond delay="0"/>
+                            </p:stCondLst>
+                            <p:childTnLst>
+                              <p:par>
+                                <p:cTn id="5" presetID="1" presetClass="entr" presetSubtype="0" fill="hold" nodeType="clickEffect">
+                                  <p:stCondLst>
+                                    <p:cond delay="0"/>
+                                  </p:stCondLst>
+                                  <p:childTnLst>
+                                    <p:set>
+                                      <p:cBhvr>
+                                        <p:cTn id="6" dur="1" fill="hold">
+                                          <p:stCondLst>
+                                            <p:cond delay="0"/>
+                                          </p:stCondLst>
+                                        </p:cTn>
+                                        <p:tgtEl>
+                                          <p:spTgt spid="6"/>
+                                        </p:tgtEl>
+                                        <p:attrNameLst>
+                                          <p:attrName>style.visibility</p:attrName>
+                                        </p:attrNameLst>
+                                      </p:cBhvr>
+                                      <p:to>
+                                        <p:strVal val="visible"/>
+                                      </p:to>
+                                    </p:set>
+                                  </p:childTnLst>
+                                </p:cTn>
+                              </p:par>
+                              <p:par>
+                                <p:cTn id="7" presetID="1" presetClass="entr" presetSubtype="0" fill="hold" nodeType="withEffect">
+                                  <p:stCondLst>
+                                    <p:cond delay="0"/>
+                                  </p:stCondLst>
+                                  <p:childTnLst>
+                                    <p:set>
+                                      <p:cBhvr>
+                                        <p:cTn id="8" dur="1" fill="hold">
+                                          <p:stCondLst>
+                                            <p:cond delay="0"/>
+                                          </p:stCondLst>
+                                        </p:cTn>
+                                        <p:tgtEl>
+                                          <p:spTgt spid="2"/>
+                                        </p:tgtEl>
+                                        <p:attrNameLst>
+                                          <p:attrName>style.visibility</p:attrName>
+                                        </p:attrNameLst>
+                                      </p:cBhvr>
+                                      <p:to>
+                                        <p:strVal val="visible"/>
+                                      </p:to>
+                                    </p:set>
+                                  </p:childTnLst>
+                                </p:cTn>
+                              </p:par>
+                            </p:childTnLst>
+                          </p:cTn>
+                        </p:par>
+                      </p:childTnLst>
+                    </p:cTn>
+                  </p:par>
+                </p:childTnLst>
+              </p:cTn>
+              <p:prevCondLst>
+                <p:cond evt="onPrev" delay="0">
+                  <p:tgtEl>
+                    <p:sldTgt/>
+                  </p:tgtEl>
+                </p:cond>
+              </p:prevCondLst>
+              <p:nextCondLst>
+                <p:cond evt="onNext" delay="0">
+                  <p:tgtEl>
+                    <p:sldTgt/>
+                  </p:tgtEl>
+                </p:cond>
+              </p:nextCondLst>
+            </p:seq>
+          </p:childTnLst>
+        </p:cTn>
+      </p:par>
+    </p:tnLst>
+  </p:timing>
+</p:sld>
+</file>
+
+<file path=ppt/slides/slide3.xml><?xml version="1.0" encoding="utf-8"?>
 <p:sld xmlns:a="http://schemas.openxmlformats.org/drawingml/2006/main" xmlns:r="http://schemas.openxmlformats.org/officeDocument/2006/relationships" xmlns:p="http://schemas.openxmlformats.org/presentationml/2006/main">
   <p:cSld>
     <p:spTree>
@@ -6786,7 +7466,7 @@
 </p:sld>
 </file>
 
-<file path=ppt/slides/slide3.xml><?xml version="1.0" encoding="utf-8"?>
+<file path=ppt/slides/slide4.xml><?xml version="1.0" encoding="utf-8"?>
 <p:sld xmlns:a="http://schemas.openxmlformats.org/drawingml/2006/main" xmlns:r="http://schemas.openxmlformats.org/officeDocument/2006/relationships" xmlns:p="http://schemas.openxmlformats.org/presentationml/2006/main">
   <p:cSld>
     <p:spTree>
@@ -6886,7 +7566,7 @@
 </p:sld>
 </file>
 
-<file path=ppt/slides/slide4.xml><?xml version="1.0" encoding="utf-8"?>
+<file path=ppt/slides/slide5.xml><?xml version="1.0" encoding="utf-8"?>
 <p:sld xmlns:a="http://schemas.openxmlformats.org/drawingml/2006/main" xmlns:r="http://schemas.openxmlformats.org/officeDocument/2006/relationships" xmlns:p="http://schemas.openxmlformats.org/presentationml/2006/main">
   <p:cSld>
     <p:spTree>
@@ -7210,7 +7890,7 @@
 </p:sld>
 </file>
 
-<file path=ppt/slides/slide5.xml><?xml version="1.0" encoding="utf-8"?>
+<file path=ppt/slides/slide6.xml><?xml version="1.0" encoding="utf-8"?>
 <p:sld xmlns:a="http://schemas.openxmlformats.org/drawingml/2006/main" xmlns:r="http://schemas.openxmlformats.org/officeDocument/2006/relationships" xmlns:p="http://schemas.openxmlformats.org/presentationml/2006/main">
   <p:cSld>
     <p:spTree>
@@ -7667,7 +8347,7 @@
 </p:sld>
 </file>
 
-<file path=ppt/slides/slide6.xml><?xml version="1.0" encoding="utf-8"?>
+<file path=ppt/slides/slide7.xml><?xml version="1.0" encoding="utf-8"?>
 <p:sld xmlns:a="http://schemas.openxmlformats.org/drawingml/2006/main" xmlns:r="http://schemas.openxmlformats.org/officeDocument/2006/relationships" xmlns:p="http://schemas.openxmlformats.org/presentationml/2006/main">
   <p:cSld>
     <p:spTree>
@@ -8289,7 +8969,7 @@
 </p:sld>
 </file>
 
-<file path=ppt/slides/slide7.xml><?xml version="1.0" encoding="utf-8"?>
+<file path=ppt/slides/slide8.xml><?xml version="1.0" encoding="utf-8"?>
 <p:sld xmlns:a="http://schemas.openxmlformats.org/drawingml/2006/main" xmlns:r="http://schemas.openxmlformats.org/officeDocument/2006/relationships" xmlns:p="http://schemas.openxmlformats.org/presentationml/2006/main">
   <p:cSld>
     <p:spTree>
@@ -9224,7 +9904,7 @@
 </p:sld>
 </file>
 
-<file path=ppt/slides/slide8.xml><?xml version="1.0" encoding="utf-8"?>
+<file path=ppt/slides/slide9.xml><?xml version="1.0" encoding="utf-8"?>
 <p:sld xmlns:a="http://schemas.openxmlformats.org/drawingml/2006/main" xmlns:r="http://schemas.openxmlformats.org/officeDocument/2006/relationships" xmlns:p="http://schemas.openxmlformats.org/presentationml/2006/main">
   <p:cSld>
     <p:spTree>
@@ -11288,499 +11968,6 @@
       <p:bldP spid="23" grpId="0" animBg="1"/>
       <p:bldP spid="15" grpId="0" animBg="1"/>
       <p:bldP spid="17" grpId="1" animBg="1"/>
-    </p:bldLst>
-  </p:timing>
-</p:sld>
-</file>
-
-<file path=ppt/slides/slide9.xml><?xml version="1.0" encoding="utf-8"?>
-<p:sld xmlns:a="http://schemas.openxmlformats.org/drawingml/2006/main" xmlns:r="http://schemas.openxmlformats.org/officeDocument/2006/relationships" xmlns:p="http://schemas.openxmlformats.org/presentationml/2006/main">
-  <p:cSld>
-    <p:spTree>
-      <p:nvGrpSpPr>
-        <p:cNvPr id="1" name=""/>
-        <p:cNvGrpSpPr/>
-        <p:nvPr/>
-      </p:nvGrpSpPr>
-      <p:grpSpPr>
-        <a:xfrm>
-          <a:off x="0" y="0"/>
-          <a:ext cx="0" cy="0"/>
-          <a:chOff x="0" y="0"/>
-          <a:chExt cx="0" cy="0"/>
-        </a:xfrm>
-      </p:grpSpPr>
-      <p:sp>
-        <p:nvSpPr>
-          <p:cNvPr id="2" name="Title 1"/>
-          <p:cNvSpPr>
-            <a:spLocks noGrp="1"/>
-          </p:cNvSpPr>
-          <p:nvPr>
-            <p:ph type="title"/>
-          </p:nvPr>
-        </p:nvSpPr>
-        <p:spPr/>
-        <p:txBody>
-          <a:bodyPr>
-            <a:normAutofit/>
-          </a:bodyPr>
-          <a:lstStyle/>
-          <a:p>
-            <a:r>
-              <a:rPr lang="en-US" dirty="0"/>
-              <a:t>The OCP newbie dialog II</a:t>
-            </a:r>
-          </a:p>
-        </p:txBody>
-      </p:sp>
-      <p:sp>
-        <p:nvSpPr>
-          <p:cNvPr id="3" name="Rounded Rectangular Callout 2"/>
-          <p:cNvSpPr/>
-          <p:nvPr/>
-        </p:nvSpPr>
-        <p:spPr>
-          <a:xfrm>
-            <a:off x="611560" y="1628799"/>
-            <a:ext cx="4104456" cy="592923"/>
-          </a:xfrm>
-          <a:prstGeom prst="wedgeRoundRectCallout">
-            <a:avLst>
-              <a:gd name="adj1" fmla="val -50248"/>
-              <a:gd name="adj2" fmla="val 104829"/>
-              <a:gd name="adj3" fmla="val 16667"/>
-            </a:avLst>
-          </a:prstGeom>
-        </p:spPr>
-        <p:style>
-          <a:lnRef idx="2">
-            <a:schemeClr val="accent1">
-              <a:shade val="50000"/>
-            </a:schemeClr>
-          </a:lnRef>
-          <a:fillRef idx="1">
-            <a:schemeClr val="accent1"/>
-          </a:fillRef>
-          <a:effectRef idx="0">
-            <a:schemeClr val="accent1"/>
-          </a:effectRef>
-          <a:fontRef idx="minor">
-            <a:schemeClr val="lt1"/>
-          </a:fontRef>
-        </p:style>
-        <p:txBody>
-          <a:bodyPr rtlCol="0" anchor="ctr"/>
-          <a:lstStyle/>
-          <a:p>
-            <a:pPr defTabSz="738188"/>
-            <a:r>
-              <a:rPr lang="en-US" sz="1600" i="1" dirty="0"/>
-              <a:t>Damn…what went wrong? I didn’t want to change </a:t>
-            </a:r>
-            <a:r>
-              <a:rPr lang="en-US" sz="1400" b="1" i="1" dirty="0" err="1">
-                <a:latin typeface="Consolas" panose="020B0609020204030204" pitchFamily="49" charset="0"/>
-                <a:cs typeface="Consolas" panose="020B0609020204030204" pitchFamily="49" charset="0"/>
-              </a:rPr>
-              <a:t>TextEditor</a:t>
-            </a:r>
-            <a:r>
-              <a:rPr lang="en-US" sz="1600" i="1" dirty="0"/>
-              <a:t>, only the printer it uses!</a:t>
-            </a:r>
-          </a:p>
-        </p:txBody>
-      </p:sp>
-      <p:sp>
-        <p:nvSpPr>
-          <p:cNvPr id="7" name="Rounded Rectangular Callout 6"/>
-          <p:cNvSpPr/>
-          <p:nvPr/>
-        </p:nvSpPr>
-        <p:spPr>
-          <a:xfrm>
-            <a:off x="2915816" y="2564904"/>
-            <a:ext cx="5400599" cy="881371"/>
-          </a:xfrm>
-          <a:prstGeom prst="wedgeRoundRectCallout">
-            <a:avLst>
-              <a:gd name="adj1" fmla="val 51223"/>
-              <a:gd name="adj2" fmla="val 124809"/>
-              <a:gd name="adj3" fmla="val 16667"/>
-            </a:avLst>
-          </a:prstGeom>
-          <a:solidFill>
-            <a:schemeClr val="accent3"/>
-          </a:solidFill>
-          <a:ln>
-            <a:solidFill>
-              <a:srgbClr val="00B050"/>
-            </a:solidFill>
-          </a:ln>
-        </p:spPr>
-        <p:style>
-          <a:lnRef idx="2">
-            <a:schemeClr val="accent1">
-              <a:shade val="50000"/>
-            </a:schemeClr>
-          </a:lnRef>
-          <a:fillRef idx="1">
-            <a:schemeClr val="accent1"/>
-          </a:fillRef>
-          <a:effectRef idx="0">
-            <a:schemeClr val="accent1"/>
-          </a:effectRef>
-          <a:fontRef idx="minor">
-            <a:schemeClr val="lt1"/>
-          </a:fontRef>
-        </p:style>
-        <p:txBody>
-          <a:bodyPr rtlCol="0" anchor="ctr"/>
-          <a:lstStyle/>
-          <a:p>
-            <a:pPr defTabSz="738188"/>
-            <a:r>
-              <a:rPr lang="en-US" sz="1400" b="1" i="1" dirty="0" err="1">
-                <a:latin typeface="Consolas" panose="020B0609020204030204" pitchFamily="49" charset="0"/>
-                <a:cs typeface="Consolas" panose="020B0609020204030204" pitchFamily="49" charset="0"/>
-              </a:rPr>
-              <a:t>TextEditor</a:t>
-            </a:r>
-            <a:r>
-              <a:rPr lang="en-US" sz="1400" b="1" i="1" dirty="0">
-                <a:latin typeface="Consolas" panose="020B0609020204030204" pitchFamily="49" charset="0"/>
-                <a:cs typeface="Consolas" panose="020B0609020204030204" pitchFamily="49" charset="0"/>
-              </a:rPr>
-              <a:t> </a:t>
-            </a:r>
-            <a:r>
-              <a:rPr lang="en-US" sz="1600" i="1" dirty="0"/>
-              <a:t>was too tightly coupled to </a:t>
-            </a:r>
-            <a:r>
-              <a:rPr lang="en-US" sz="1400" b="1" i="1" dirty="0">
-                <a:latin typeface="Consolas" panose="020B0609020204030204" pitchFamily="49" charset="0"/>
-                <a:cs typeface="Consolas" panose="020B0609020204030204" pitchFamily="49" charset="0"/>
-              </a:rPr>
-              <a:t>Printer</a:t>
-            </a:r>
-            <a:r>
-              <a:rPr lang="en-US" sz="1600" i="1" dirty="0"/>
-              <a:t>, therefore extensions to the printer used rippled through –</a:t>
-            </a:r>
-            <a:r>
-              <a:rPr lang="en-US" sz="1400" b="1" i="1" dirty="0" err="1">
-                <a:latin typeface="Consolas" panose="020B0609020204030204" pitchFamily="49" charset="0"/>
-                <a:cs typeface="Consolas" panose="020B0609020204030204" pitchFamily="49" charset="0"/>
-              </a:rPr>
-              <a:t>TextEditor</a:t>
-            </a:r>
-            <a:r>
-              <a:rPr lang="en-US" sz="1400" b="1" i="1" dirty="0">
-                <a:latin typeface="Consolas" panose="020B0609020204030204" pitchFamily="49" charset="0"/>
-                <a:cs typeface="Consolas" panose="020B0609020204030204" pitchFamily="49" charset="0"/>
-              </a:rPr>
-              <a:t> </a:t>
-            </a:r>
-            <a:r>
-              <a:rPr lang="en-US" sz="1600" i="1" dirty="0"/>
-              <a:t>was not closed for modifications when changes were needed…</a:t>
-            </a:r>
-          </a:p>
-        </p:txBody>
-      </p:sp>
-      <p:sp>
-        <p:nvSpPr>
-          <p:cNvPr id="8" name="Rounded Rectangular Callout 7"/>
-          <p:cNvSpPr/>
-          <p:nvPr/>
-        </p:nvSpPr>
-        <p:spPr>
-          <a:xfrm>
-            <a:off x="609554" y="3879985"/>
-            <a:ext cx="5690637" cy="826222"/>
-          </a:xfrm>
-          <a:prstGeom prst="wedgeRoundRectCallout">
-            <a:avLst>
-              <a:gd name="adj1" fmla="val -50248"/>
-              <a:gd name="adj2" fmla="val 104829"/>
-              <a:gd name="adj3" fmla="val 16667"/>
-            </a:avLst>
-          </a:prstGeom>
-        </p:spPr>
-        <p:style>
-          <a:lnRef idx="2">
-            <a:schemeClr val="accent1">
-              <a:shade val="50000"/>
-            </a:schemeClr>
-          </a:lnRef>
-          <a:fillRef idx="1">
-            <a:schemeClr val="accent1"/>
-          </a:fillRef>
-          <a:effectRef idx="0">
-            <a:schemeClr val="accent1"/>
-          </a:effectRef>
-          <a:fontRef idx="minor">
-            <a:schemeClr val="lt1"/>
-          </a:fontRef>
-        </p:style>
-        <p:txBody>
-          <a:bodyPr rtlCol="0" anchor="ctr"/>
-          <a:lstStyle/>
-          <a:p>
-            <a:pPr defTabSz="738188"/>
-            <a:r>
-              <a:rPr lang="en-US" sz="1600" i="1" dirty="0"/>
-              <a:t>But how could I ever avoid that? It is a whole new printer I am trying to use. And what if the supported printer is changed again? Or if we need to support several printers?</a:t>
-            </a:r>
-          </a:p>
-        </p:txBody>
-      </p:sp>
-      <p:sp>
-        <p:nvSpPr>
-          <p:cNvPr id="10" name="Rounded Rectangular Callout 9"/>
-          <p:cNvSpPr/>
-          <p:nvPr/>
-        </p:nvSpPr>
-        <p:spPr>
-          <a:xfrm>
-            <a:off x="4064612" y="5157192"/>
-            <a:ext cx="4217195" cy="864096"/>
-          </a:xfrm>
-          <a:prstGeom prst="wedgeRoundRectCallout">
-            <a:avLst>
-              <a:gd name="adj1" fmla="val 52474"/>
-              <a:gd name="adj2" fmla="val 69863"/>
-              <a:gd name="adj3" fmla="val 16667"/>
-            </a:avLst>
-          </a:prstGeom>
-          <a:solidFill>
-            <a:schemeClr val="accent3"/>
-          </a:solidFill>
-          <a:ln>
-            <a:solidFill>
-              <a:srgbClr val="00B050"/>
-            </a:solidFill>
-          </a:ln>
-        </p:spPr>
-        <p:style>
-          <a:lnRef idx="2">
-            <a:schemeClr val="accent1">
-              <a:shade val="50000"/>
-            </a:schemeClr>
-          </a:lnRef>
-          <a:fillRef idx="1">
-            <a:schemeClr val="accent1"/>
-          </a:fillRef>
-          <a:effectRef idx="0">
-            <a:schemeClr val="accent1"/>
-          </a:effectRef>
-          <a:fontRef idx="minor">
-            <a:schemeClr val="lt1"/>
-          </a:fontRef>
-        </p:style>
-        <p:txBody>
-          <a:bodyPr rtlCol="0" anchor="ctr"/>
-          <a:lstStyle/>
-          <a:p>
-            <a:pPr defTabSz="738188"/>
-            <a:r>
-              <a:rPr lang="en-US" sz="1600" i="1" dirty="0"/>
-              <a:t>We could apply OCP and make </a:t>
-            </a:r>
-            <a:r>
-              <a:rPr lang="en-US" sz="1400" b="1" i="1" dirty="0" err="1">
-                <a:latin typeface="Consolas" panose="020B0609020204030204" pitchFamily="49" charset="0"/>
-                <a:cs typeface="Consolas" panose="020B0609020204030204" pitchFamily="49" charset="0"/>
-              </a:rPr>
-              <a:t>TextEditor</a:t>
-            </a:r>
-            <a:r>
-              <a:rPr lang="en-US" sz="1600" i="1" dirty="0"/>
-              <a:t> open for extension (the new printer or printers) but closed for modifications…let me show you!</a:t>
-            </a:r>
-          </a:p>
-        </p:txBody>
-      </p:sp>
-    </p:spTree>
-    <p:extLst>
-      <p:ext uri="{BB962C8B-B14F-4D97-AF65-F5344CB8AC3E}">
-        <p14:creationId xmlns:p14="http://schemas.microsoft.com/office/powerpoint/2010/main" val="1408931691"/>
-      </p:ext>
-    </p:extLst>
-  </p:cSld>
-  <p:clrMapOvr>
-    <a:masterClrMapping/>
-  </p:clrMapOvr>
-  <p:timing>
-    <p:tnLst>
-      <p:par>
-        <p:cTn id="1" dur="indefinite" restart="never" nodeType="tmRoot">
-          <p:childTnLst>
-            <p:seq concurrent="1" nextAc="seek">
-              <p:cTn id="2" dur="indefinite" nodeType="mainSeq">
-                <p:childTnLst>
-                  <p:par>
-                    <p:cTn id="3" fill="hold">
-                      <p:stCondLst>
-                        <p:cond delay="indefinite"/>
-                      </p:stCondLst>
-                      <p:childTnLst>
-                        <p:par>
-                          <p:cTn id="4" fill="hold">
-                            <p:stCondLst>
-                              <p:cond delay="0"/>
-                            </p:stCondLst>
-                            <p:childTnLst>
-                              <p:par>
-                                <p:cTn id="5" presetID="1" presetClass="entr" presetSubtype="0" fill="hold" grpId="0" nodeType="clickEffect">
-                                  <p:stCondLst>
-                                    <p:cond delay="0"/>
-                                  </p:stCondLst>
-                                  <p:childTnLst>
-                                    <p:set>
-                                      <p:cBhvr>
-                                        <p:cTn id="6" dur="1" fill="hold">
-                                          <p:stCondLst>
-                                            <p:cond delay="0"/>
-                                          </p:stCondLst>
-                                        </p:cTn>
-                                        <p:tgtEl>
-                                          <p:spTgt spid="7"/>
-                                        </p:tgtEl>
-                                        <p:attrNameLst>
-                                          <p:attrName>style.visibility</p:attrName>
-                                        </p:attrNameLst>
-                                      </p:cBhvr>
-                                      <p:to>
-                                        <p:strVal val="visible"/>
-                                      </p:to>
-                                    </p:set>
-                                  </p:childTnLst>
-                                </p:cTn>
-                              </p:par>
-                            </p:childTnLst>
-                          </p:cTn>
-                        </p:par>
-                      </p:childTnLst>
-                    </p:cTn>
-                  </p:par>
-                  <p:par>
-                    <p:cTn id="7" fill="hold">
-                      <p:stCondLst>
-                        <p:cond delay="indefinite"/>
-                      </p:stCondLst>
-                      <p:childTnLst>
-                        <p:par>
-                          <p:cTn id="8" fill="hold">
-                            <p:stCondLst>
-                              <p:cond delay="0"/>
-                            </p:stCondLst>
-                            <p:childTnLst>
-                              <p:par>
-                                <p:cTn id="9" presetID="1" presetClass="entr" presetSubtype="0" fill="hold" grpId="0" nodeType="clickEffect">
-                                  <p:stCondLst>
-                                    <p:cond delay="0"/>
-                                  </p:stCondLst>
-                                  <p:childTnLst>
-                                    <p:set>
-                                      <p:cBhvr>
-                                        <p:cTn id="10" dur="1" fill="hold">
-                                          <p:stCondLst>
-                                            <p:cond delay="0"/>
-                                          </p:stCondLst>
-                                        </p:cTn>
-                                        <p:tgtEl>
-                                          <p:spTgt spid="8"/>
-                                        </p:tgtEl>
-                                        <p:attrNameLst>
-                                          <p:attrName>style.visibility</p:attrName>
-                                        </p:attrNameLst>
-                                      </p:cBhvr>
-                                      <p:to>
-                                        <p:strVal val="visible"/>
-                                      </p:to>
-                                    </p:set>
-                                  </p:childTnLst>
-                                </p:cTn>
-                              </p:par>
-                            </p:childTnLst>
-                          </p:cTn>
-                        </p:par>
-                      </p:childTnLst>
-                    </p:cTn>
-                  </p:par>
-                  <p:par>
-                    <p:cTn id="11" fill="hold">
-                      <p:stCondLst>
-                        <p:cond delay="indefinite"/>
-                      </p:stCondLst>
-                      <p:childTnLst>
-                        <p:par>
-                          <p:cTn id="12" fill="hold">
-                            <p:stCondLst>
-                              <p:cond delay="0"/>
-                            </p:stCondLst>
-                            <p:childTnLst>
-                              <p:par>
-                                <p:cTn id="13" presetID="1" presetClass="entr" presetSubtype="0" fill="hold" grpId="0" nodeType="clickEffect">
-                                  <p:stCondLst>
-                                    <p:cond delay="0"/>
-                                  </p:stCondLst>
-                                  <p:childTnLst>
-                                    <p:set>
-                                      <p:cBhvr>
-                                        <p:cTn id="14" dur="1" fill="hold">
-                                          <p:stCondLst>
-                                            <p:cond delay="0"/>
-                                          </p:stCondLst>
-                                        </p:cTn>
-                                        <p:tgtEl>
-                                          <p:spTgt spid="10"/>
-                                        </p:tgtEl>
-                                        <p:attrNameLst>
-                                          <p:attrName>style.visibility</p:attrName>
-                                        </p:attrNameLst>
-                                      </p:cBhvr>
-                                      <p:to>
-                                        <p:strVal val="visible"/>
-                                      </p:to>
-                                    </p:set>
-                                  </p:childTnLst>
-                                </p:cTn>
-                              </p:par>
-                            </p:childTnLst>
-                          </p:cTn>
-                        </p:par>
-                      </p:childTnLst>
-                    </p:cTn>
-                  </p:par>
-                </p:childTnLst>
-              </p:cTn>
-              <p:prevCondLst>
-                <p:cond evt="onPrev" delay="0">
-                  <p:tgtEl>
-                    <p:sldTgt/>
-                  </p:tgtEl>
-                </p:cond>
-              </p:prevCondLst>
-              <p:nextCondLst>
-                <p:cond evt="onNext" delay="0">
-                  <p:tgtEl>
-                    <p:sldTgt/>
-                  </p:tgtEl>
-                </p:cond>
-              </p:nextCondLst>
-            </p:seq>
-          </p:childTnLst>
-        </p:cTn>
-      </p:par>
-    </p:tnLst>
-    <p:bldLst>
-      <p:bldP spid="7" grpId="0" animBg="1"/>
-      <p:bldP spid="8" grpId="0" animBg="1"/>
-      <p:bldP spid="10" grpId="0" animBg="1"/>
     </p:bldLst>
   </p:timing>
 </p:sld>

</xml_diff>